<commit_message>
final slides and views
</commit_message>
<xml_diff>
--- a/slidedeck/slides.pptx
+++ b/slidedeck/slides.pptx
@@ -8,7 +8,7 @@
     <p:sldMasterId id="2147483690" r:id="rId4"/>
   </p:sldMasterIdLst>
   <p:notesMasterIdLst>
-    <p:notesMasterId r:id="rId43"/>
+    <p:notesMasterId r:id="rId46"/>
   </p:notesMasterIdLst>
   <p:sldIdLst>
     <p:sldId id="256" r:id="rId5"/>
@@ -33,22 +33,25 @@
     <p:sldId id="298" r:id="rId24"/>
     <p:sldId id="282" r:id="rId25"/>
     <p:sldId id="272" r:id="rId26"/>
-    <p:sldId id="267" r:id="rId27"/>
-    <p:sldId id="279" r:id="rId28"/>
-    <p:sldId id="262" r:id="rId29"/>
-    <p:sldId id="280" r:id="rId30"/>
-    <p:sldId id="281" r:id="rId31"/>
-    <p:sldId id="299" r:id="rId32"/>
-    <p:sldId id="258" r:id="rId33"/>
-    <p:sldId id="274" r:id="rId34"/>
-    <p:sldId id="273" r:id="rId35"/>
-    <p:sldId id="263" r:id="rId36"/>
-    <p:sldId id="277" r:id="rId37"/>
-    <p:sldId id="265" r:id="rId38"/>
-    <p:sldId id="264" r:id="rId39"/>
-    <p:sldId id="259" r:id="rId40"/>
-    <p:sldId id="261" r:id="rId41"/>
-    <p:sldId id="276" r:id="rId42"/>
+    <p:sldId id="302" r:id="rId27"/>
+    <p:sldId id="267" r:id="rId28"/>
+    <p:sldId id="279" r:id="rId29"/>
+    <p:sldId id="262" r:id="rId30"/>
+    <p:sldId id="280" r:id="rId31"/>
+    <p:sldId id="281" r:id="rId32"/>
+    <p:sldId id="299" r:id="rId33"/>
+    <p:sldId id="258" r:id="rId34"/>
+    <p:sldId id="274" r:id="rId35"/>
+    <p:sldId id="273" r:id="rId36"/>
+    <p:sldId id="263" r:id="rId37"/>
+    <p:sldId id="277" r:id="rId38"/>
+    <p:sldId id="265" r:id="rId39"/>
+    <p:sldId id="264" r:id="rId40"/>
+    <p:sldId id="259" r:id="rId41"/>
+    <p:sldId id="261" r:id="rId42"/>
+    <p:sldId id="300" r:id="rId43"/>
+    <p:sldId id="276" r:id="rId44"/>
+    <p:sldId id="301" r:id="rId45"/>
   </p:sldIdLst>
   <p:sldSz cx="12192000" cy="6858000"/>
   <p:notesSz cx="6858000" cy="9144000"/>
@@ -28006,6 +28009,136 @@
     <p:bg>
       <p:bgPr>
         <a:solidFill>
+          <a:srgbClr val="000000"/>
+        </a:solidFill>
+        <a:effectLst/>
+      </p:bgPr>
+    </p:bg>
+    <p:spTree>
+      <p:nvGrpSpPr>
+        <p:cNvPr id="1" name=""/>
+        <p:cNvGrpSpPr/>
+        <p:nvPr/>
+      </p:nvGrpSpPr>
+      <p:grpSpPr>
+        <a:xfrm>
+          <a:off x="0" y="0"/>
+          <a:ext cx="0" cy="0"/>
+          <a:chOff x="0" y="0"/>
+          <a:chExt cx="0" cy="0"/>
+        </a:xfrm>
+      </p:grpSpPr>
+      <p:pic>
+        <p:nvPicPr>
+          <p:cNvPr id="4" name="Picture 3"/>
+          <p:cNvPicPr>
+            <a:picLocks noChangeAspect="1"/>
+          </p:cNvPicPr>
+          <p:nvPr/>
+        </p:nvPicPr>
+        <p:blipFill>
+          <a:blip r:embed="rId2">
+            <a:extLst>
+              <a:ext uri="{28A0092B-C50C-407E-A947-70E740481C1C}">
+                <a14:useLocalDpi xmlns:a14="http://schemas.microsoft.com/office/drawing/2010/main" val="0"/>
+              </a:ext>
+            </a:extLst>
+          </a:blip>
+          <a:stretch>
+            <a:fillRect/>
+          </a:stretch>
+        </p:blipFill>
+        <p:spPr>
+          <a:xfrm>
+            <a:off x="0" y="0"/>
+            <a:ext cx="12195961" cy="1106905"/>
+          </a:xfrm>
+          <a:prstGeom prst="rect">
+            <a:avLst/>
+          </a:prstGeom>
+        </p:spPr>
+      </p:pic>
+      <p:sp>
+        <p:nvSpPr>
+          <p:cNvPr id="2" name="TextBox 1"/>
+          <p:cNvSpPr txBox="1"/>
+          <p:nvPr/>
+        </p:nvSpPr>
+        <p:spPr>
+          <a:xfrm>
+            <a:off x="924560" y="3042920"/>
+            <a:ext cx="6664960" cy="1754326"/>
+          </a:xfrm>
+          <a:prstGeom prst="rect">
+            <a:avLst/>
+          </a:prstGeom>
+          <a:noFill/>
+        </p:spPr>
+        <p:txBody>
+          <a:bodyPr wrap="square" rtlCol="0">
+            <a:spAutoFit/>
+          </a:bodyPr>
+          <a:lstStyle/>
+          <a:p>
+            <a:r>
+              <a:rPr lang="en-US" sz="3600" dirty="0" smtClean="0">
+                <a:solidFill>
+                  <a:schemeClr val="bg1"/>
+                </a:solidFill>
+              </a:rPr>
+              <a:t>Blocking = Network, Disk</a:t>
+            </a:r>
+          </a:p>
+          <a:p>
+            <a:endParaRPr lang="en-US" sz="3600" kern="1200" dirty="0">
+              <a:solidFill>
+                <a:schemeClr val="bg1"/>
+              </a:solidFill>
+            </a:endParaRPr>
+          </a:p>
+          <a:p>
+            <a:r>
+              <a:rPr lang="en-US" sz="3600" dirty="0" smtClean="0">
+                <a:solidFill>
+                  <a:schemeClr val="bg1"/>
+                </a:solidFill>
+              </a:rPr>
+              <a:t>Non-blocking = L1, L2, RAM</a:t>
+            </a:r>
+            <a:endParaRPr lang="en-US" sz="3600" kern="1200" dirty="0">
+              <a:solidFill>
+                <a:schemeClr val="bg1"/>
+              </a:solidFill>
+            </a:endParaRPr>
+          </a:p>
+        </p:txBody>
+      </p:sp>
+    </p:spTree>
+    <p:extLst>
+      <p:ext uri="{BB962C8B-B14F-4D97-AF65-F5344CB8AC3E}">
+        <p14:creationId xmlns:p14="http://schemas.microsoft.com/office/powerpoint/2010/main" val="2805081414"/>
+      </p:ext>
+    </p:extLst>
+  </p:cSld>
+  <p:clrMapOvr>
+    <a:masterClrMapping/>
+  </p:clrMapOvr>
+  <p:timing>
+    <p:tnLst>
+      <p:par>
+        <p:cTn id="1" dur="indefinite" restart="never" nodeType="tmRoot"/>
+      </p:par>
+    </p:tnLst>
+  </p:timing>
+</p:sld>
+</file>
+
+<file path=ppt/slides/slide24.xml><?xml version="1.0" encoding="utf-8"?>
+<p:sld xmlns:a="http://schemas.openxmlformats.org/drawingml/2006/main" xmlns:r="http://schemas.openxmlformats.org/officeDocument/2006/relationships" xmlns:p="http://schemas.openxmlformats.org/presentationml/2006/main">
+  <p:cSld>
+    <p:bg>
+      <p:bgPr>
+        <a:solidFill>
           <a:schemeClr val="bg1"/>
         </a:solidFill>
         <a:effectLst/>
@@ -29286,7 +29419,7 @@
 </p:sld>
 </file>
 
-<file path=ppt/slides/slide24.xml><?xml version="1.0" encoding="utf-8"?>
+<file path=ppt/slides/slide25.xml><?xml version="1.0" encoding="utf-8"?>
 <p:sld xmlns:a="http://schemas.openxmlformats.org/drawingml/2006/main" xmlns:r="http://schemas.openxmlformats.org/officeDocument/2006/relationships" xmlns:p="http://schemas.openxmlformats.org/presentationml/2006/main">
   <p:cSld>
     <p:spTree>
@@ -29641,7 +29774,7 @@
 </p:sld>
 </file>
 
-<file path=ppt/slides/slide25.xml><?xml version="1.0" encoding="utf-8"?>
+<file path=ppt/slides/slide26.xml><?xml version="1.0" encoding="utf-8"?>
 <p:sld xmlns:a="http://schemas.openxmlformats.org/drawingml/2006/main" xmlns:r="http://schemas.openxmlformats.org/officeDocument/2006/relationships" xmlns:p="http://schemas.openxmlformats.org/presentationml/2006/main">
   <p:cSld>
     <p:bg>
@@ -30754,7 +30887,7 @@
 </p:sld>
 </file>
 
-<file path=ppt/slides/slide26.xml><?xml version="1.0" encoding="utf-8"?>
+<file path=ppt/slides/slide27.xml><?xml version="1.0" encoding="utf-8"?>
 <p:sld xmlns:a="http://schemas.openxmlformats.org/drawingml/2006/main" xmlns:r="http://schemas.openxmlformats.org/officeDocument/2006/relationships" xmlns:p="http://schemas.openxmlformats.org/presentationml/2006/main">
   <p:cSld>
     <p:bg>
@@ -31160,7 +31293,7 @@
 </p:sld>
 </file>
 
-<file path=ppt/slides/slide27.xml><?xml version="1.0" encoding="utf-8"?>
+<file path=ppt/slides/slide28.xml><?xml version="1.0" encoding="utf-8"?>
 <p:sld xmlns:a="http://schemas.openxmlformats.org/drawingml/2006/main" xmlns:r="http://schemas.openxmlformats.org/officeDocument/2006/relationships" xmlns:p="http://schemas.openxmlformats.org/presentationml/2006/main">
   <p:cSld>
     <p:bg>
@@ -31492,7 +31625,7 @@
 </p:sld>
 </file>
 
-<file path=ppt/slides/slide28.xml><?xml version="1.0" encoding="utf-8"?>
+<file path=ppt/slides/slide29.xml><?xml version="1.0" encoding="utf-8"?>
 <p:sld xmlns:a="http://schemas.openxmlformats.org/drawingml/2006/main" xmlns:r="http://schemas.openxmlformats.org/officeDocument/2006/relationships" xmlns:p="http://schemas.openxmlformats.org/presentationml/2006/main">
   <p:cSld>
     <p:bg>
@@ -32079,7 +32212,208 @@
 </p:sld>
 </file>
 
-<file path=ppt/slides/slide29.xml><?xml version="1.0" encoding="utf-8"?>
+<file path=ppt/slides/slide3.xml><?xml version="1.0" encoding="utf-8"?>
+<p:sld xmlns:a="http://schemas.openxmlformats.org/drawingml/2006/main" xmlns:r="http://schemas.openxmlformats.org/officeDocument/2006/relationships" xmlns:p="http://schemas.openxmlformats.org/presentationml/2006/main">
+  <p:cSld>
+    <p:bg>
+      <p:bgPr>
+        <a:solidFill>
+          <a:schemeClr val="bg1"/>
+        </a:solidFill>
+        <a:effectLst/>
+      </p:bgPr>
+    </p:bg>
+    <p:spTree>
+      <p:nvGrpSpPr>
+        <p:cNvPr id="1" name=""/>
+        <p:cNvGrpSpPr/>
+        <p:nvPr/>
+      </p:nvGrpSpPr>
+      <p:grpSpPr>
+        <a:xfrm>
+          <a:off x="0" y="0"/>
+          <a:ext cx="0" cy="0"/>
+          <a:chOff x="0" y="0"/>
+          <a:chExt cx="0" cy="0"/>
+        </a:xfrm>
+      </p:grpSpPr>
+      <p:pic>
+        <p:nvPicPr>
+          <p:cNvPr id="4" name="Picture 3"/>
+          <p:cNvPicPr>
+            <a:picLocks noChangeAspect="1"/>
+          </p:cNvPicPr>
+          <p:nvPr/>
+        </p:nvPicPr>
+        <p:blipFill>
+          <a:blip r:embed="rId2">
+            <a:extLst>
+              <a:ext uri="{28A0092B-C50C-407E-A947-70E740481C1C}">
+                <a14:useLocalDpi xmlns:a14="http://schemas.microsoft.com/office/drawing/2010/main" val="0"/>
+              </a:ext>
+            </a:extLst>
+          </a:blip>
+          <a:stretch>
+            <a:fillRect/>
+          </a:stretch>
+        </p:blipFill>
+        <p:spPr>
+          <a:xfrm>
+            <a:off x="0" y="0"/>
+            <a:ext cx="12195961" cy="1106905"/>
+          </a:xfrm>
+          <a:prstGeom prst="rect">
+            <a:avLst/>
+          </a:prstGeom>
+        </p:spPr>
+      </p:pic>
+      <p:sp>
+        <p:nvSpPr>
+          <p:cNvPr id="2" name="TextBox 1"/>
+          <p:cNvSpPr txBox="1"/>
+          <p:nvPr/>
+        </p:nvSpPr>
+        <p:spPr>
+          <a:xfrm>
+            <a:off x="669634" y="1595718"/>
+            <a:ext cx="3953262" cy="769441"/>
+          </a:xfrm>
+          <a:prstGeom prst="rect">
+            <a:avLst/>
+          </a:prstGeom>
+          <a:noFill/>
+        </p:spPr>
+        <p:txBody>
+          <a:bodyPr wrap="none" rtlCol="0">
+            <a:spAutoFit/>
+          </a:bodyPr>
+          <a:lstStyle/>
+          <a:p>
+            <a:r>
+              <a:rPr lang="en-US" sz="4400" dirty="0" smtClean="0">
+                <a:solidFill>
+                  <a:prstClr val="black"/>
+                </a:solidFill>
+              </a:rPr>
+              <a:t>Azure Web Apps</a:t>
+            </a:r>
+            <a:endParaRPr lang="en-US" sz="4400" dirty="0">
+              <a:solidFill>
+                <a:prstClr val="black"/>
+              </a:solidFill>
+            </a:endParaRPr>
+          </a:p>
+        </p:txBody>
+      </p:sp>
+      <p:sp>
+        <p:nvSpPr>
+          <p:cNvPr id="3" name="TextBox 2"/>
+          <p:cNvSpPr txBox="1"/>
+          <p:nvPr/>
+        </p:nvSpPr>
+        <p:spPr>
+          <a:xfrm>
+            <a:off x="669634" y="3585882"/>
+            <a:ext cx="5964248" cy="1200329"/>
+          </a:xfrm>
+          <a:prstGeom prst="rect">
+            <a:avLst/>
+          </a:prstGeom>
+          <a:noFill/>
+        </p:spPr>
+        <p:txBody>
+          <a:bodyPr wrap="square" rtlCol="0">
+            <a:spAutoFit/>
+          </a:bodyPr>
+          <a:lstStyle/>
+          <a:p>
+            <a:pPr marL="285750" indent="-285750">
+              <a:buFont typeface="Arial" charset="0"/>
+              <a:buChar char="•"/>
+            </a:pPr>
+            <a:r>
+              <a:rPr lang="en-US" sz="3600" dirty="0" smtClean="0">
+                <a:solidFill>
+                  <a:prstClr val="black"/>
+                </a:solidFill>
+              </a:rPr>
+              <a:t>What is </a:t>
+            </a:r>
+            <a:r>
+              <a:rPr lang="en-US" sz="3600" dirty="0" err="1" smtClean="0">
+                <a:solidFill>
+                  <a:prstClr val="black"/>
+                </a:solidFill>
+              </a:rPr>
+              <a:t>PaaS</a:t>
+            </a:r>
+            <a:r>
+              <a:rPr lang="en-US" sz="3600" dirty="0" smtClean="0">
+                <a:solidFill>
+                  <a:prstClr val="black"/>
+                </a:solidFill>
+              </a:rPr>
+              <a:t>?</a:t>
+            </a:r>
+          </a:p>
+          <a:p>
+            <a:pPr marL="285750" indent="-285750">
+              <a:buFont typeface="Arial" charset="0"/>
+              <a:buChar char="•"/>
+            </a:pPr>
+            <a:r>
+              <a:rPr lang="en-US" sz="3600" dirty="0" smtClean="0">
+                <a:solidFill>
+                  <a:prstClr val="black"/>
+                </a:solidFill>
+              </a:rPr>
+              <a:t>Why choose </a:t>
+            </a:r>
+            <a:r>
+              <a:rPr lang="en-US" sz="3600" dirty="0" err="1" smtClean="0">
+                <a:solidFill>
+                  <a:prstClr val="black"/>
+                </a:solidFill>
+              </a:rPr>
+              <a:t>PaaS</a:t>
+            </a:r>
+            <a:r>
+              <a:rPr lang="en-US" sz="3600" dirty="0" smtClean="0">
+                <a:solidFill>
+                  <a:prstClr val="black"/>
+                </a:solidFill>
+              </a:rPr>
+              <a:t>?</a:t>
+            </a:r>
+            <a:endParaRPr lang="en-US" sz="3600" dirty="0">
+              <a:solidFill>
+                <a:prstClr val="black"/>
+              </a:solidFill>
+            </a:endParaRPr>
+          </a:p>
+        </p:txBody>
+      </p:sp>
+    </p:spTree>
+    <p:extLst>
+      <p:ext uri="{BB962C8B-B14F-4D97-AF65-F5344CB8AC3E}">
+        <p14:creationId xmlns:p14="http://schemas.microsoft.com/office/powerpoint/2010/main" val="145448824"/>
+      </p:ext>
+    </p:extLst>
+  </p:cSld>
+  <p:clrMapOvr>
+    <a:masterClrMapping/>
+  </p:clrMapOvr>
+  <p:timing>
+    <p:tnLst>
+      <p:par>
+        <p:cTn id="1" dur="indefinite" restart="never" nodeType="tmRoot"/>
+      </p:par>
+    </p:tnLst>
+  </p:timing>
+</p:sld>
+</file>
+
+<file path=ppt/slides/slide30.xml><?xml version="1.0" encoding="utf-8"?>
 <p:sld xmlns:a="http://schemas.openxmlformats.org/drawingml/2006/main" xmlns:r="http://schemas.openxmlformats.org/officeDocument/2006/relationships" xmlns:p="http://schemas.openxmlformats.org/presentationml/2006/main">
   <p:cSld>
     <p:bg>
@@ -32827,208 +33161,7 @@
 </p:sld>
 </file>
 
-<file path=ppt/slides/slide3.xml><?xml version="1.0" encoding="utf-8"?>
-<p:sld xmlns:a="http://schemas.openxmlformats.org/drawingml/2006/main" xmlns:r="http://schemas.openxmlformats.org/officeDocument/2006/relationships" xmlns:p="http://schemas.openxmlformats.org/presentationml/2006/main">
-  <p:cSld>
-    <p:bg>
-      <p:bgPr>
-        <a:solidFill>
-          <a:schemeClr val="bg1"/>
-        </a:solidFill>
-        <a:effectLst/>
-      </p:bgPr>
-    </p:bg>
-    <p:spTree>
-      <p:nvGrpSpPr>
-        <p:cNvPr id="1" name=""/>
-        <p:cNvGrpSpPr/>
-        <p:nvPr/>
-      </p:nvGrpSpPr>
-      <p:grpSpPr>
-        <a:xfrm>
-          <a:off x="0" y="0"/>
-          <a:ext cx="0" cy="0"/>
-          <a:chOff x="0" y="0"/>
-          <a:chExt cx="0" cy="0"/>
-        </a:xfrm>
-      </p:grpSpPr>
-      <p:pic>
-        <p:nvPicPr>
-          <p:cNvPr id="4" name="Picture 3"/>
-          <p:cNvPicPr>
-            <a:picLocks noChangeAspect="1"/>
-          </p:cNvPicPr>
-          <p:nvPr/>
-        </p:nvPicPr>
-        <p:blipFill>
-          <a:blip r:embed="rId2">
-            <a:extLst>
-              <a:ext uri="{28A0092B-C50C-407E-A947-70E740481C1C}">
-                <a14:useLocalDpi xmlns:a14="http://schemas.microsoft.com/office/drawing/2010/main" val="0"/>
-              </a:ext>
-            </a:extLst>
-          </a:blip>
-          <a:stretch>
-            <a:fillRect/>
-          </a:stretch>
-        </p:blipFill>
-        <p:spPr>
-          <a:xfrm>
-            <a:off x="0" y="0"/>
-            <a:ext cx="12195961" cy="1106905"/>
-          </a:xfrm>
-          <a:prstGeom prst="rect">
-            <a:avLst/>
-          </a:prstGeom>
-        </p:spPr>
-      </p:pic>
-      <p:sp>
-        <p:nvSpPr>
-          <p:cNvPr id="2" name="TextBox 1"/>
-          <p:cNvSpPr txBox="1"/>
-          <p:nvPr/>
-        </p:nvSpPr>
-        <p:spPr>
-          <a:xfrm>
-            <a:off x="669634" y="1595718"/>
-            <a:ext cx="3953262" cy="769441"/>
-          </a:xfrm>
-          <a:prstGeom prst="rect">
-            <a:avLst/>
-          </a:prstGeom>
-          <a:noFill/>
-        </p:spPr>
-        <p:txBody>
-          <a:bodyPr wrap="none" rtlCol="0">
-            <a:spAutoFit/>
-          </a:bodyPr>
-          <a:lstStyle/>
-          <a:p>
-            <a:r>
-              <a:rPr lang="en-US" sz="4400" dirty="0" smtClean="0">
-                <a:solidFill>
-                  <a:prstClr val="black"/>
-                </a:solidFill>
-              </a:rPr>
-              <a:t>Azure Web Apps</a:t>
-            </a:r>
-            <a:endParaRPr lang="en-US" sz="4400" dirty="0">
-              <a:solidFill>
-                <a:prstClr val="black"/>
-              </a:solidFill>
-            </a:endParaRPr>
-          </a:p>
-        </p:txBody>
-      </p:sp>
-      <p:sp>
-        <p:nvSpPr>
-          <p:cNvPr id="3" name="TextBox 2"/>
-          <p:cNvSpPr txBox="1"/>
-          <p:nvPr/>
-        </p:nvSpPr>
-        <p:spPr>
-          <a:xfrm>
-            <a:off x="669634" y="3585882"/>
-            <a:ext cx="5964248" cy="1200329"/>
-          </a:xfrm>
-          <a:prstGeom prst="rect">
-            <a:avLst/>
-          </a:prstGeom>
-          <a:noFill/>
-        </p:spPr>
-        <p:txBody>
-          <a:bodyPr wrap="square" rtlCol="0">
-            <a:spAutoFit/>
-          </a:bodyPr>
-          <a:lstStyle/>
-          <a:p>
-            <a:pPr marL="285750" indent="-285750">
-              <a:buFont typeface="Arial" charset="0"/>
-              <a:buChar char="•"/>
-            </a:pPr>
-            <a:r>
-              <a:rPr lang="en-US" sz="3600" dirty="0" smtClean="0">
-                <a:solidFill>
-                  <a:prstClr val="black"/>
-                </a:solidFill>
-              </a:rPr>
-              <a:t>What is </a:t>
-            </a:r>
-            <a:r>
-              <a:rPr lang="en-US" sz="3600" dirty="0" err="1" smtClean="0">
-                <a:solidFill>
-                  <a:prstClr val="black"/>
-                </a:solidFill>
-              </a:rPr>
-              <a:t>PaaS</a:t>
-            </a:r>
-            <a:r>
-              <a:rPr lang="en-US" sz="3600" dirty="0" smtClean="0">
-                <a:solidFill>
-                  <a:prstClr val="black"/>
-                </a:solidFill>
-              </a:rPr>
-              <a:t>?</a:t>
-            </a:r>
-          </a:p>
-          <a:p>
-            <a:pPr marL="285750" indent="-285750">
-              <a:buFont typeface="Arial" charset="0"/>
-              <a:buChar char="•"/>
-            </a:pPr>
-            <a:r>
-              <a:rPr lang="en-US" sz="3600" dirty="0" smtClean="0">
-                <a:solidFill>
-                  <a:prstClr val="black"/>
-                </a:solidFill>
-              </a:rPr>
-              <a:t>Why choose </a:t>
-            </a:r>
-            <a:r>
-              <a:rPr lang="en-US" sz="3600" dirty="0" err="1" smtClean="0">
-                <a:solidFill>
-                  <a:prstClr val="black"/>
-                </a:solidFill>
-              </a:rPr>
-              <a:t>PaaS</a:t>
-            </a:r>
-            <a:r>
-              <a:rPr lang="en-US" sz="3600" dirty="0" smtClean="0">
-                <a:solidFill>
-                  <a:prstClr val="black"/>
-                </a:solidFill>
-              </a:rPr>
-              <a:t>?</a:t>
-            </a:r>
-            <a:endParaRPr lang="en-US" sz="3600" dirty="0">
-              <a:solidFill>
-                <a:prstClr val="black"/>
-              </a:solidFill>
-            </a:endParaRPr>
-          </a:p>
-        </p:txBody>
-      </p:sp>
-    </p:spTree>
-    <p:extLst>
-      <p:ext uri="{BB962C8B-B14F-4D97-AF65-F5344CB8AC3E}">
-        <p14:creationId xmlns:p14="http://schemas.microsoft.com/office/powerpoint/2010/main" val="145448824"/>
-      </p:ext>
-    </p:extLst>
-  </p:cSld>
-  <p:clrMapOvr>
-    <a:masterClrMapping/>
-  </p:clrMapOvr>
-  <p:timing>
-    <p:tnLst>
-      <p:par>
-        <p:cTn id="1" dur="indefinite" restart="never" nodeType="tmRoot"/>
-      </p:par>
-    </p:tnLst>
-  </p:timing>
-</p:sld>
-</file>
-
-<file path=ppt/slides/slide30.xml><?xml version="1.0" encoding="utf-8"?>
+<file path=ppt/slides/slide31.xml><?xml version="1.0" encoding="utf-8"?>
 <p:sld xmlns:a="http://schemas.openxmlformats.org/drawingml/2006/main" xmlns:r="http://schemas.openxmlformats.org/officeDocument/2006/relationships" xmlns:p="http://schemas.openxmlformats.org/presentationml/2006/main">
   <p:cSld>
     <p:bg>
@@ -33466,7 +33599,7 @@
 </p:sld>
 </file>
 
-<file path=ppt/slides/slide31.xml><?xml version="1.0" encoding="utf-8"?>
+<file path=ppt/slides/slide32.xml><?xml version="1.0" encoding="utf-8"?>
 <p:sld xmlns:a="http://schemas.openxmlformats.org/drawingml/2006/main" xmlns:r="http://schemas.openxmlformats.org/officeDocument/2006/relationships" xmlns:p="http://schemas.openxmlformats.org/presentationml/2006/main">
   <p:cSld>
     <p:bg>
@@ -33619,7 +33752,7 @@
 </p:sld>
 </file>
 
-<file path=ppt/slides/slide32.xml><?xml version="1.0" encoding="utf-8"?>
+<file path=ppt/slides/slide33.xml><?xml version="1.0" encoding="utf-8"?>
 <p:sld xmlns:a="http://schemas.openxmlformats.org/drawingml/2006/main" xmlns:r="http://schemas.openxmlformats.org/officeDocument/2006/relationships" xmlns:p="http://schemas.openxmlformats.org/presentationml/2006/main">
   <p:cSld>
     <p:bg>
@@ -33789,7 +33922,7 @@
 </p:sld>
 </file>
 
-<file path=ppt/slides/slide33.xml><?xml version="1.0" encoding="utf-8"?>
+<file path=ppt/slides/slide34.xml><?xml version="1.0" encoding="utf-8"?>
 <p:sld xmlns:a="http://schemas.openxmlformats.org/drawingml/2006/main" xmlns:r="http://schemas.openxmlformats.org/officeDocument/2006/relationships" xmlns:p="http://schemas.openxmlformats.org/presentationml/2006/main">
   <p:cSld>
     <p:bg>
@@ -33887,7 +34020,7 @@
 </p:sld>
 </file>
 
-<file path=ppt/slides/slide34.xml><?xml version="1.0" encoding="utf-8"?>
+<file path=ppt/slides/slide35.xml><?xml version="1.0" encoding="utf-8"?>
 <p:sld xmlns:a="http://schemas.openxmlformats.org/drawingml/2006/main" xmlns:r="http://schemas.openxmlformats.org/officeDocument/2006/relationships" xmlns:p="http://schemas.openxmlformats.org/presentationml/2006/main">
   <p:cSld>
     <p:bg>
@@ -34040,7 +34173,7 @@
 </p:sld>
 </file>
 
-<file path=ppt/slides/slide35.xml><?xml version="1.0" encoding="utf-8"?>
+<file path=ppt/slides/slide36.xml><?xml version="1.0" encoding="utf-8"?>
 <p:sld xmlns:a="http://schemas.openxmlformats.org/drawingml/2006/main" xmlns:r="http://schemas.openxmlformats.org/officeDocument/2006/relationships" xmlns:p="http://schemas.openxmlformats.org/presentationml/2006/main">
   <p:cSld>
     <p:bg>
@@ -34574,7 +34707,7 @@
 </p:sld>
 </file>
 
-<file path=ppt/slides/slide36.xml><?xml version="1.0" encoding="utf-8"?>
+<file path=ppt/slides/slide37.xml><?xml version="1.0" encoding="utf-8"?>
 <p:sld xmlns:a="http://schemas.openxmlformats.org/drawingml/2006/main" xmlns:r="http://schemas.openxmlformats.org/officeDocument/2006/relationships" xmlns:p="http://schemas.openxmlformats.org/presentationml/2006/main">
   <p:cSld>
     <p:bg>
@@ -35582,7 +35715,7 @@
 </p:sld>
 </file>
 
-<file path=ppt/slides/slide37.xml><?xml version="1.0" encoding="utf-8"?>
+<file path=ppt/slides/slide38.xml><?xml version="1.0" encoding="utf-8"?>
 <p:sld xmlns:a="http://schemas.openxmlformats.org/drawingml/2006/main" xmlns:r="http://schemas.openxmlformats.org/officeDocument/2006/relationships" xmlns:p="http://schemas.openxmlformats.org/presentationml/2006/main">
   <p:cSld>
     <p:bg>
@@ -36436,7 +36569,7 @@
 </p:sld>
 </file>
 
-<file path=ppt/slides/slide38.xml><?xml version="1.0" encoding="utf-8"?>
+<file path=ppt/slides/slide39.xml><?xml version="1.0" encoding="utf-8"?>
 <p:sld xmlns:a="http://schemas.openxmlformats.org/drawingml/2006/main" xmlns:r="http://schemas.openxmlformats.org/officeDocument/2006/relationships" xmlns:p="http://schemas.openxmlformats.org/presentationml/2006/main">
   <p:cSld>
     <p:bg>
@@ -36463,38 +36596,169 @@
       </p:grpSpPr>
       <p:pic>
         <p:nvPicPr>
-          <p:cNvPr id="3" name="Picture 2"/>
+          <p:cNvPr id="1026" name="Picture 2" descr="http://img.lum.dolimg.com/v1/images/sebulba_1f3fe180.jpeg?region=0%2C0%2C2763%2C1380"/>
           <p:cNvPicPr>
-            <a:picLocks noChangeAspect="1"/>
+            <a:picLocks noChangeAspect="1" noChangeArrowheads="1"/>
           </p:cNvPicPr>
           <p:nvPr/>
         </p:nvPicPr>
         <p:blipFill>
-          <a:blip r:embed="rId2" cstate="print">
+          <a:blip r:embed="rId2">
             <a:extLst>
               <a:ext uri="{28A0092B-C50C-407E-A947-70E740481C1C}">
                 <a14:useLocalDpi xmlns:a14="http://schemas.microsoft.com/office/drawing/2010/main" val="0"/>
               </a:ext>
             </a:extLst>
           </a:blip>
+          <a:srcRect/>
           <a:stretch>
             <a:fillRect/>
           </a:stretch>
         </p:blipFill>
-        <p:spPr>
+        <p:spPr bwMode="auto">
           <a:xfrm>
-            <a:off x="3660348" y="2563569"/>
-            <a:ext cx="4702269" cy="1729699"/>
+            <a:off x="0" y="0"/>
+            <a:ext cx="13507642" cy="6858000"/>
           </a:xfrm>
           <a:prstGeom prst="rect">
             <a:avLst/>
           </a:prstGeom>
         </p:spPr>
+        <p:style>
+          <a:lnRef idx="2">
+            <a:schemeClr val="dk1">
+              <a:shade val="50000"/>
+            </a:schemeClr>
+          </a:lnRef>
+          <a:fillRef idx="1">
+            <a:schemeClr val="dk1"/>
+          </a:fillRef>
+          <a:effectRef idx="0">
+            <a:schemeClr val="dk1"/>
+          </a:effectRef>
+          <a:fontRef idx="minor">
+            <a:schemeClr val="lt1"/>
+          </a:fontRef>
+        </p:style>
       </p:pic>
+      <p:sp>
+        <p:nvSpPr>
+          <p:cNvPr id="6" name="TextBox 5"/>
+          <p:cNvSpPr txBox="1"/>
+          <p:nvPr/>
+        </p:nvSpPr>
+        <p:spPr>
+          <a:xfrm>
+            <a:off x="401320" y="6223000"/>
+            <a:ext cx="3123374" cy="369332"/>
+          </a:xfrm>
+          <a:prstGeom prst="rect">
+            <a:avLst/>
+          </a:prstGeom>
+        </p:spPr>
+        <p:style>
+          <a:lnRef idx="2">
+            <a:schemeClr val="dk1">
+              <a:shade val="50000"/>
+            </a:schemeClr>
+          </a:lnRef>
+          <a:fillRef idx="1">
+            <a:schemeClr val="dk1"/>
+          </a:fillRef>
+          <a:effectRef idx="0">
+            <a:schemeClr val="dk1"/>
+          </a:effectRef>
+          <a:fontRef idx="minor">
+            <a:schemeClr val="lt1"/>
+          </a:fontRef>
+        </p:style>
+        <p:txBody>
+          <a:bodyPr wrap="square" rtlCol="0">
+            <a:spAutoFit/>
+          </a:bodyPr>
+          <a:lstStyle/>
+          <a:p>
+            <a:pPr algn="ctr"/>
+            <a:r>
+              <a:rPr lang="en-US" dirty="0" smtClean="0"/>
+              <a:t>Image Copyright </a:t>
+            </a:r>
+            <a:r>
+              <a:rPr lang="en-US" dirty="0" err="1" smtClean="0"/>
+              <a:t>Lucasfilm</a:t>
+            </a:r>
+            <a:r>
+              <a:rPr lang="en-US" dirty="0" smtClean="0"/>
+              <a:t> LTD</a:t>
+            </a:r>
+            <a:endParaRPr lang="en-US" sz="1800" kern="1200" dirty="0">
+              <a:solidFill>
+                <a:schemeClr val="tx1"/>
+              </a:solidFill>
+              <a:latin typeface="+mn-lt"/>
+              <a:ea typeface="+mn-ea"/>
+              <a:cs typeface="+mn-cs"/>
+            </a:endParaRPr>
+          </a:p>
+        </p:txBody>
+      </p:sp>
+      <p:sp>
+        <p:nvSpPr>
+          <p:cNvPr id="7" name="TextBox 6"/>
+          <p:cNvSpPr txBox="1"/>
+          <p:nvPr/>
+        </p:nvSpPr>
+        <p:spPr>
+          <a:xfrm>
+            <a:off x="6593840" y="3251200"/>
+            <a:ext cx="6913802" cy="1015663"/>
+          </a:xfrm>
+          <a:prstGeom prst="rect">
+            <a:avLst/>
+          </a:prstGeom>
+        </p:spPr>
+        <p:style>
+          <a:lnRef idx="2">
+            <a:schemeClr val="dk1">
+              <a:shade val="50000"/>
+            </a:schemeClr>
+          </a:lnRef>
+          <a:fillRef idx="1">
+            <a:schemeClr val="dk1"/>
+          </a:fillRef>
+          <a:effectRef idx="0">
+            <a:schemeClr val="dk1"/>
+          </a:effectRef>
+          <a:fontRef idx="minor">
+            <a:schemeClr val="lt1"/>
+          </a:fontRef>
+        </p:style>
+        <p:txBody>
+          <a:bodyPr wrap="square" rtlCol="0">
+            <a:spAutoFit/>
+          </a:bodyPr>
+          <a:lstStyle/>
+          <a:p>
+            <a:r>
+              <a:rPr lang="en-US" sz="6000" dirty="0" smtClean="0">
+                <a:solidFill>
+                  <a:srgbClr val="DBE8CA"/>
+                </a:solidFill>
+              </a:rPr>
+              <a:t>    LIVE DEMO</a:t>
+            </a:r>
+            <a:endParaRPr lang="en-US" sz="6000" dirty="0">
+              <a:solidFill>
+                <a:srgbClr val="DBE8CA"/>
+              </a:solidFill>
+            </a:endParaRPr>
+          </a:p>
+        </p:txBody>
+      </p:sp>
     </p:spTree>
     <p:extLst>
       <p:ext uri="{BB962C8B-B14F-4D97-AF65-F5344CB8AC3E}">
-        <p14:creationId xmlns:p14="http://schemas.microsoft.com/office/powerpoint/2010/main" val="647369093"/>
+        <p14:creationId xmlns:p14="http://schemas.microsoft.com/office/powerpoint/2010/main" val="2755014547"/>
       </p:ext>
     </p:extLst>
   </p:cSld>
@@ -36646,6 +36910,205 @@
     <p:extLst>
       <p:ext uri="{BB962C8B-B14F-4D97-AF65-F5344CB8AC3E}">
         <p14:creationId xmlns:p14="http://schemas.microsoft.com/office/powerpoint/2010/main" val="4240160399"/>
+      </p:ext>
+    </p:extLst>
+  </p:cSld>
+  <p:clrMapOvr>
+    <a:masterClrMapping/>
+  </p:clrMapOvr>
+  <p:timing>
+    <p:tnLst>
+      <p:par>
+        <p:cTn id="1" dur="indefinite" restart="never" nodeType="tmRoot"/>
+      </p:par>
+    </p:tnLst>
+  </p:timing>
+</p:sld>
+</file>
+
+<file path=ppt/slides/slide40.xml><?xml version="1.0" encoding="utf-8"?>
+<p:sld xmlns:a="http://schemas.openxmlformats.org/drawingml/2006/main" xmlns:r="http://schemas.openxmlformats.org/officeDocument/2006/relationships" xmlns:p="http://schemas.openxmlformats.org/presentationml/2006/main">
+  <p:cSld>
+    <p:bg>
+      <p:bgPr>
+        <a:solidFill>
+          <a:schemeClr val="bg1"/>
+        </a:solidFill>
+        <a:effectLst/>
+      </p:bgPr>
+    </p:bg>
+    <p:spTree>
+      <p:nvGrpSpPr>
+        <p:cNvPr id="1" name=""/>
+        <p:cNvGrpSpPr/>
+        <p:nvPr/>
+      </p:nvGrpSpPr>
+      <p:grpSpPr>
+        <a:xfrm>
+          <a:off x="0" y="0"/>
+          <a:ext cx="0" cy="0"/>
+          <a:chOff x="0" y="0"/>
+          <a:chExt cx="0" cy="0"/>
+        </a:xfrm>
+      </p:grpSpPr>
+      <p:pic>
+        <p:nvPicPr>
+          <p:cNvPr id="2050" name="Picture 2" descr="http://i.imgur.com/zSQhG4d.png"/>
+          <p:cNvPicPr>
+            <a:picLocks noChangeAspect="1" noChangeArrowheads="1"/>
+          </p:cNvPicPr>
+          <p:nvPr/>
+        </p:nvPicPr>
+        <p:blipFill>
+          <a:blip r:embed="rId2">
+            <a:extLst>
+              <a:ext uri="{28A0092B-C50C-407E-A947-70E740481C1C}">
+                <a14:useLocalDpi xmlns:a14="http://schemas.microsoft.com/office/drawing/2010/main" val="0"/>
+              </a:ext>
+            </a:extLst>
+          </a:blip>
+          <a:srcRect/>
+          <a:stretch>
+            <a:fillRect/>
+          </a:stretch>
+        </p:blipFill>
+        <p:spPr bwMode="auto">
+          <a:xfrm>
+            <a:off x="1323975" y="1170940"/>
+            <a:ext cx="9753600" cy="5486400"/>
+          </a:xfrm>
+          <a:prstGeom prst="rect">
+            <a:avLst/>
+          </a:prstGeom>
+          <a:noFill/>
+          <a:extLst>
+            <a:ext uri="{909E8E84-426E-40DD-AFC4-6F175D3DCCD1}">
+              <a14:hiddenFill xmlns:a14="http://schemas.microsoft.com/office/drawing/2010/main">
+                <a:solidFill>
+                  <a:srgbClr val="FFFFFF"/>
+                </a:solidFill>
+              </a14:hiddenFill>
+            </a:ext>
+          </a:extLst>
+        </p:spPr>
+      </p:pic>
+      <p:sp>
+        <p:nvSpPr>
+          <p:cNvPr id="4" name="TextBox 3"/>
+          <p:cNvSpPr txBox="1"/>
+          <p:nvPr/>
+        </p:nvSpPr>
+        <p:spPr>
+          <a:xfrm>
+            <a:off x="467360" y="416560"/>
+            <a:ext cx="5577840" cy="461665"/>
+          </a:xfrm>
+          <a:prstGeom prst="rect">
+            <a:avLst/>
+          </a:prstGeom>
+          <a:noFill/>
+        </p:spPr>
+        <p:txBody>
+          <a:bodyPr wrap="square" rtlCol="0">
+            <a:spAutoFit/>
+          </a:bodyPr>
+          <a:lstStyle/>
+          <a:p>
+            <a:r>
+              <a:rPr lang="en-US" sz="2400" dirty="0" smtClean="0"/>
+              <a:t>1</a:t>
+            </a:r>
+            <a:r>
+              <a:rPr lang="en-US" sz="2400" baseline="30000" dirty="0" smtClean="0"/>
+              <a:t>st</a:t>
+            </a:r>
+            <a:r>
+              <a:rPr lang="en-US" sz="2400" dirty="0" smtClean="0"/>
+              <a:t> draft (AKA all we had one week ago):</a:t>
+            </a:r>
+            <a:endParaRPr lang="en-US" sz="2400" dirty="0"/>
+          </a:p>
+        </p:txBody>
+      </p:sp>
+    </p:spTree>
+    <p:extLst>
+      <p:ext uri="{BB962C8B-B14F-4D97-AF65-F5344CB8AC3E}">
+        <p14:creationId xmlns:p14="http://schemas.microsoft.com/office/powerpoint/2010/main" val="647369093"/>
+      </p:ext>
+    </p:extLst>
+  </p:cSld>
+  <p:clrMapOvr>
+    <a:masterClrMapping/>
+  </p:clrMapOvr>
+  <p:timing>
+    <p:tnLst>
+      <p:par>
+        <p:cTn id="1" dur="indefinite" restart="never" nodeType="tmRoot"/>
+      </p:par>
+    </p:tnLst>
+  </p:timing>
+</p:sld>
+</file>
+
+<file path=ppt/slides/slide41.xml><?xml version="1.0" encoding="utf-8"?>
+<p:sld xmlns:a="http://schemas.openxmlformats.org/drawingml/2006/main" xmlns:r="http://schemas.openxmlformats.org/officeDocument/2006/relationships" xmlns:p="http://schemas.openxmlformats.org/presentationml/2006/main">
+  <p:cSld>
+    <p:bg>
+      <p:bgPr>
+        <a:solidFill>
+          <a:schemeClr val="bg1"/>
+        </a:solidFill>
+        <a:effectLst/>
+      </p:bgPr>
+    </p:bg>
+    <p:spTree>
+      <p:nvGrpSpPr>
+        <p:cNvPr id="1" name=""/>
+        <p:cNvGrpSpPr/>
+        <p:nvPr/>
+      </p:nvGrpSpPr>
+      <p:grpSpPr>
+        <a:xfrm>
+          <a:off x="0" y="0"/>
+          <a:ext cx="0" cy="0"/>
+          <a:chOff x="0" y="0"/>
+          <a:chExt cx="0" cy="0"/>
+        </a:xfrm>
+      </p:grpSpPr>
+      <p:pic>
+        <p:nvPicPr>
+          <p:cNvPr id="3" name="Picture 2"/>
+          <p:cNvPicPr>
+            <a:picLocks noChangeAspect="1"/>
+          </p:cNvPicPr>
+          <p:nvPr/>
+        </p:nvPicPr>
+        <p:blipFill>
+          <a:blip r:embed="rId2" cstate="print">
+            <a:extLst>
+              <a:ext uri="{28A0092B-C50C-407E-A947-70E740481C1C}">
+                <a14:useLocalDpi xmlns:a14="http://schemas.microsoft.com/office/drawing/2010/main" val="0"/>
+              </a:ext>
+            </a:extLst>
+          </a:blip>
+          <a:stretch>
+            <a:fillRect/>
+          </a:stretch>
+        </p:blipFill>
+        <p:spPr>
+          <a:xfrm>
+            <a:off x="3660348" y="2563569"/>
+            <a:ext cx="4702269" cy="1729699"/>
+          </a:xfrm>
+          <a:prstGeom prst="rect">
+            <a:avLst/>
+          </a:prstGeom>
+        </p:spPr>
+      </p:pic>
+    </p:spTree>
+    <p:extLst>
+      <p:ext uri="{BB962C8B-B14F-4D97-AF65-F5344CB8AC3E}">
+        <p14:creationId xmlns:p14="http://schemas.microsoft.com/office/powerpoint/2010/main" val="2089736766"/>
       </p:ext>
     </p:extLst>
   </p:cSld>

</xml_diff>